<commit_message>
MAJ 05/04/2018 Signed-off-by: DrBlaf <chauveau.aurelien.76@gmail.com>
</commit_message>
<xml_diff>
--- a/poster/poster_maison_du_futur.pptx
+++ b/poster/poster_maison_du_futur.pptx
@@ -289,7 +289,7 @@
             <a:fld id="{AA309A6D-C09C-4548-B29A-6CF363A7E532}" type="datetimeFigureOut">
               <a:rPr lang="fr-FR" smtClean="0"/>
               <a:pPr/>
-              <a:t>26/03/2018</a:t>
+              <a:t>04/04/2018</a:t>
             </a:fld>
             <a:endParaRPr lang="fr-BE"/>
           </a:p>
@@ -456,7 +456,7 @@
             <a:fld id="{AA309A6D-C09C-4548-B29A-6CF363A7E532}" type="datetimeFigureOut">
               <a:rPr lang="fr-FR" smtClean="0"/>
               <a:pPr/>
-              <a:t>26/03/2018</a:t>
+              <a:t>04/04/2018</a:t>
             </a:fld>
             <a:endParaRPr lang="fr-BE"/>
           </a:p>
@@ -633,7 +633,7 @@
             <a:fld id="{AA309A6D-C09C-4548-B29A-6CF363A7E532}" type="datetimeFigureOut">
               <a:rPr lang="fr-FR" smtClean="0"/>
               <a:pPr/>
-              <a:t>26/03/2018</a:t>
+              <a:t>04/04/2018</a:t>
             </a:fld>
             <a:endParaRPr lang="fr-BE"/>
           </a:p>
@@ -800,7 +800,7 @@
             <a:fld id="{AA309A6D-C09C-4548-B29A-6CF363A7E532}" type="datetimeFigureOut">
               <a:rPr lang="fr-FR" smtClean="0"/>
               <a:pPr/>
-              <a:t>26/03/2018</a:t>
+              <a:t>04/04/2018</a:t>
             </a:fld>
             <a:endParaRPr lang="fr-BE"/>
           </a:p>
@@ -1043,7 +1043,7 @@
             <a:fld id="{AA309A6D-C09C-4548-B29A-6CF363A7E532}" type="datetimeFigureOut">
               <a:rPr lang="fr-FR" smtClean="0"/>
               <a:pPr/>
-              <a:t>26/03/2018</a:t>
+              <a:t>04/04/2018</a:t>
             </a:fld>
             <a:endParaRPr lang="fr-BE"/>
           </a:p>
@@ -1328,7 +1328,7 @@
             <a:fld id="{AA309A6D-C09C-4548-B29A-6CF363A7E532}" type="datetimeFigureOut">
               <a:rPr lang="fr-FR" smtClean="0"/>
               <a:pPr/>
-              <a:t>26/03/2018</a:t>
+              <a:t>04/04/2018</a:t>
             </a:fld>
             <a:endParaRPr lang="fr-BE"/>
           </a:p>
@@ -1747,7 +1747,7 @@
             <a:fld id="{AA309A6D-C09C-4548-B29A-6CF363A7E532}" type="datetimeFigureOut">
               <a:rPr lang="fr-FR" smtClean="0"/>
               <a:pPr/>
-              <a:t>26/03/2018</a:t>
+              <a:t>04/04/2018</a:t>
             </a:fld>
             <a:endParaRPr lang="fr-BE"/>
           </a:p>
@@ -1862,7 +1862,7 @@
             <a:fld id="{AA309A6D-C09C-4548-B29A-6CF363A7E532}" type="datetimeFigureOut">
               <a:rPr lang="fr-FR" smtClean="0"/>
               <a:pPr/>
-              <a:t>26/03/2018</a:t>
+              <a:t>04/04/2018</a:t>
             </a:fld>
             <a:endParaRPr lang="fr-BE"/>
           </a:p>
@@ -1954,7 +1954,7 @@
             <a:fld id="{AA309A6D-C09C-4548-B29A-6CF363A7E532}" type="datetimeFigureOut">
               <a:rPr lang="fr-FR" smtClean="0"/>
               <a:pPr/>
-              <a:t>26/03/2018</a:t>
+              <a:t>04/04/2018</a:t>
             </a:fld>
             <a:endParaRPr lang="fr-BE"/>
           </a:p>
@@ -2228,7 +2228,7 @@
             <a:fld id="{AA309A6D-C09C-4548-B29A-6CF363A7E532}" type="datetimeFigureOut">
               <a:rPr lang="fr-FR" smtClean="0"/>
               <a:pPr/>
-              <a:t>26/03/2018</a:t>
+              <a:t>04/04/2018</a:t>
             </a:fld>
             <a:endParaRPr lang="fr-BE"/>
           </a:p>
@@ -2478,7 +2478,7 @@
             <a:fld id="{AA309A6D-C09C-4548-B29A-6CF363A7E532}" type="datetimeFigureOut">
               <a:rPr lang="fr-FR" smtClean="0"/>
               <a:pPr/>
-              <a:t>26/03/2018</a:t>
+              <a:t>04/04/2018</a:t>
             </a:fld>
             <a:endParaRPr lang="fr-BE"/>
           </a:p>
@@ -2691,7 +2691,7 @@
             <a:fld id="{AA309A6D-C09C-4548-B29A-6CF363A7E532}" type="datetimeFigureOut">
               <a:rPr lang="fr-FR" smtClean="0"/>
               <a:pPr/>
-              <a:t>26/03/2018</a:t>
+              <a:t>04/04/2018</a:t>
             </a:fld>
             <a:endParaRPr lang="fr-BE"/>
           </a:p>
@@ -3582,7 +3582,7 @@
         <p:spPr>
           <a:xfrm>
             <a:off x="1138139" y="4973522"/>
-            <a:ext cx="13430344" cy="12757320"/>
+            <a:ext cx="13430344" cy="13880705"/>
           </a:xfrm>
           <a:prstGeom prst="rect">
             <a:avLst/>
@@ -3599,19 +3599,13 @@
               <a:rPr lang="fr-FR" sz="7300" dirty="0" smtClean="0">
                 <a:latin typeface="Agency FB" pitchFamily="34" charset="0"/>
               </a:rPr>
-              <a:t>Le lycée Raymond Queneau à eu l’idée de </a:t>
+              <a:t>Le lycée Raymond Queneau a eu l’idée de proposer le projet « la maison du futur » afin de mettre en valeur la formation du BTS Système Numérique. </a:t>
             </a:r>
             <a:r>
               <a:rPr lang="fr-FR" sz="7300" dirty="0" smtClean="0">
                 <a:latin typeface="Agency FB" pitchFamily="34" charset="0"/>
               </a:rPr>
-              <a:t>proposer </a:t>
-            </a:r>
-            <a:r>
-              <a:rPr lang="fr-FR" sz="7300" dirty="0" smtClean="0">
-                <a:latin typeface="Agency FB" pitchFamily="34" charset="0"/>
-              </a:rPr>
-              <a:t>le projet « la maison du futur » afin de mettre en valeur la formation du BTS Système Numérique. Ce projet consiste à </a:t>
+              <a:t>Ce </a:t>
             </a:r>
             <a:r>
               <a:rPr lang="fr-FR" sz="7300" b="1" dirty="0" smtClean="0">
@@ -3620,7 +3614,7 @@
                 </a:solidFill>
                 <a:latin typeface="Agency FB" pitchFamily="34" charset="0"/>
               </a:rPr>
-              <a:t>connecter</a:t>
+              <a:t>projet</a:t>
             </a:r>
             <a:r>
               <a:rPr lang="fr-FR" sz="7300" dirty="0" smtClean="0">
@@ -3635,31 +3629,19 @@
                 </a:solidFill>
                 <a:latin typeface="Agency FB" pitchFamily="34" charset="0"/>
               </a:rPr>
-              <a:t>une maison </a:t>
+              <a:t>domotique</a:t>
             </a:r>
             <a:r>
               <a:rPr lang="fr-FR" sz="7300" dirty="0" smtClean="0">
                 <a:latin typeface="Agency FB" pitchFamily="34" charset="0"/>
               </a:rPr>
-              <a:t>et </a:t>
+              <a:t> </a:t>
             </a:r>
             <a:r>
               <a:rPr lang="fr-FR" sz="7300" dirty="0" smtClean="0">
                 <a:latin typeface="Agency FB" pitchFamily="34" charset="0"/>
               </a:rPr>
-              <a:t>tous </a:t>
-            </a:r>
-            <a:r>
-              <a:rPr lang="fr-FR" sz="7300" dirty="0" smtClean="0">
-                <a:latin typeface="Agency FB" pitchFamily="34" charset="0"/>
-              </a:rPr>
-              <a:t>ses </a:t>
-            </a:r>
-            <a:r>
-              <a:rPr lang="fr-FR" sz="7300" dirty="0" smtClean="0">
-                <a:latin typeface="Agency FB" pitchFamily="34" charset="0"/>
-              </a:rPr>
-              <a:t>capteurs</a:t>
+              <a:t>consiste à </a:t>
             </a:r>
             <a:r>
               <a:rPr lang="fr-FR" sz="7300" b="1" dirty="0" smtClean="0">
@@ -3668,13 +3650,13 @@
                 </a:solidFill>
                 <a:latin typeface="Agency FB" pitchFamily="34" charset="0"/>
               </a:rPr>
+              <a:t>connecter</a:t>
+            </a:r>
+            <a:r>
+              <a:rPr lang="fr-FR" sz="7300" dirty="0" smtClean="0">
+                <a:latin typeface="Agency FB" pitchFamily="34" charset="0"/>
+              </a:rPr>
               <a:t> </a:t>
-            </a:r>
-            <a:r>
-              <a:rPr lang="fr-FR" sz="7300" dirty="0" smtClean="0">
-                <a:latin typeface="Agency FB" pitchFamily="34" charset="0"/>
-              </a:rPr>
-              <a:t>à une </a:t>
             </a:r>
             <a:r>
               <a:rPr lang="fr-FR" sz="7300" b="1" dirty="0" smtClean="0">
@@ -3683,25 +3665,13 @@
                 </a:solidFill>
                 <a:latin typeface="Agency FB" pitchFamily="34" charset="0"/>
               </a:rPr>
-              <a:t>application</a:t>
+              <a:t>une maison </a:t>
             </a:r>
             <a:r>
               <a:rPr lang="fr-FR" sz="7300" dirty="0" smtClean="0">
                 <a:latin typeface="Agency FB" pitchFamily="34" charset="0"/>
               </a:rPr>
-              <a:t> </a:t>
-            </a:r>
-            <a:r>
-              <a:rPr lang="fr-FR" sz="7300" dirty="0" err="1" smtClean="0">
-                <a:latin typeface="Agency FB" pitchFamily="34" charset="0"/>
-              </a:rPr>
-              <a:t>Android</a:t>
-            </a:r>
-            <a:r>
-              <a:rPr lang="fr-FR" sz="7300" dirty="0" smtClean="0">
-                <a:latin typeface="Agency FB" pitchFamily="34" charset="0"/>
-              </a:rPr>
-              <a:t> et à un </a:t>
+              <a:t>et tous ses capteurs</a:t>
             </a:r>
             <a:r>
               <a:rPr lang="fr-FR" sz="7300" b="1" dirty="0" smtClean="0">
@@ -3710,26 +3680,13 @@
                 </a:solidFill>
                 <a:latin typeface="Agency FB" pitchFamily="34" charset="0"/>
               </a:rPr>
-              <a:t>serveur Web</a:t>
+              <a:t> </a:t>
             </a:r>
             <a:r>
               <a:rPr lang="fr-FR" sz="7300" dirty="0" smtClean="0">
                 <a:latin typeface="Agency FB" pitchFamily="34" charset="0"/>
               </a:rPr>
-              <a:t>.</a:t>
-            </a:r>
-          </a:p>
-          <a:p>
-            <a:endParaRPr lang="fr-FR" sz="2000" dirty="0" smtClean="0">
-              <a:latin typeface="Agency FB" pitchFamily="34" charset="0"/>
-            </a:endParaRPr>
-          </a:p>
-          <a:p>
-            <a:r>
-              <a:rPr lang="fr-FR" sz="7300" dirty="0" smtClean="0">
-                <a:latin typeface="Agency FB" pitchFamily="34" charset="0"/>
-              </a:rPr>
-              <a:t>Nous pourrons alors récupérer divers </a:t>
+              <a:t>à une </a:t>
             </a:r>
             <a:r>
               <a:rPr lang="fr-FR" sz="7300" b="1" dirty="0" smtClean="0">
@@ -3738,13 +3695,25 @@
                 </a:solidFill>
                 <a:latin typeface="Agency FB" pitchFamily="34" charset="0"/>
               </a:rPr>
-              <a:t>informations</a:t>
+              <a:t>application</a:t>
             </a:r>
             <a:r>
               <a:rPr lang="fr-FR" sz="7300" dirty="0" smtClean="0">
                 <a:latin typeface="Agency FB" pitchFamily="34" charset="0"/>
               </a:rPr>
-              <a:t> issues des </a:t>
+              <a:t> </a:t>
+            </a:r>
+            <a:r>
+              <a:rPr lang="fr-FR" sz="7300" dirty="0" err="1" smtClean="0">
+                <a:latin typeface="Agency FB" pitchFamily="34" charset="0"/>
+              </a:rPr>
+              <a:t>Android</a:t>
+            </a:r>
+            <a:r>
+              <a:rPr lang="fr-FR" sz="7300" dirty="0" smtClean="0">
+                <a:latin typeface="Agency FB" pitchFamily="34" charset="0"/>
+              </a:rPr>
+              <a:t> et à un </a:t>
             </a:r>
             <a:r>
               <a:rPr lang="fr-FR" sz="7300" b="1" dirty="0" smtClean="0">
@@ -3753,13 +3722,26 @@
                 </a:solidFill>
                 <a:latin typeface="Agency FB" pitchFamily="34" charset="0"/>
               </a:rPr>
-              <a:t>capteurs</a:t>
+              <a:t>serveur Web</a:t>
             </a:r>
             <a:r>
               <a:rPr lang="fr-FR" sz="7300" dirty="0" smtClean="0">
                 <a:latin typeface="Agency FB" pitchFamily="34" charset="0"/>
               </a:rPr>
-              <a:t> et gérer différents </a:t>
+              <a:t>.</a:t>
+            </a:r>
+          </a:p>
+          <a:p>
+            <a:endParaRPr lang="fr-FR" sz="2000" dirty="0" smtClean="0">
+              <a:latin typeface="Agency FB" pitchFamily="34" charset="0"/>
+            </a:endParaRPr>
+          </a:p>
+          <a:p>
+            <a:r>
+              <a:rPr lang="fr-FR" sz="7300" dirty="0" smtClean="0">
+                <a:latin typeface="Agency FB" pitchFamily="34" charset="0"/>
+              </a:rPr>
+              <a:t>Nous pourrons alors récupérer divers </a:t>
             </a:r>
             <a:r>
               <a:rPr lang="fr-FR" sz="7300" b="1" dirty="0" smtClean="0">
@@ -3768,13 +3750,13 @@
                 </a:solidFill>
                 <a:latin typeface="Agency FB" pitchFamily="34" charset="0"/>
               </a:rPr>
-              <a:t>actionneurs</a:t>
+              <a:t>informations</a:t>
             </a:r>
             <a:r>
               <a:rPr lang="fr-FR" sz="7300" dirty="0" smtClean="0">
                 <a:latin typeface="Agency FB" pitchFamily="34" charset="0"/>
               </a:rPr>
-              <a:t>. Un </a:t>
+              <a:t> issues des </a:t>
             </a:r>
             <a:r>
               <a:rPr lang="fr-FR" sz="7300" b="1" dirty="0" smtClean="0">
@@ -3783,13 +3765,43 @@
                 </a:solidFill>
                 <a:latin typeface="Agency FB" pitchFamily="34" charset="0"/>
               </a:rPr>
-              <a:t>système de sécurité</a:t>
+              <a:t>capteurs</a:t>
             </a:r>
             <a:r>
               <a:rPr lang="fr-FR" sz="7300" dirty="0" smtClean="0">
                 <a:latin typeface="Agency FB" pitchFamily="34" charset="0"/>
               </a:rPr>
-              <a:t> équipera également la maison.</a:t>
+              <a:t> et gérer différents </a:t>
+            </a:r>
+            <a:r>
+              <a:rPr lang="fr-FR" sz="7300" b="1" dirty="0" smtClean="0">
+                <a:solidFill>
+                  <a:srgbClr val="07578A"/>
+                </a:solidFill>
+                <a:latin typeface="Agency FB" pitchFamily="34" charset="0"/>
+              </a:rPr>
+              <a:t>actionneurs</a:t>
+            </a:r>
+            <a:r>
+              <a:rPr lang="fr-FR" sz="7300" dirty="0" smtClean="0">
+                <a:latin typeface="Agency FB" pitchFamily="34" charset="0"/>
+              </a:rPr>
+              <a:t>. La maison sera également équipé d’un </a:t>
+            </a:r>
+            <a:r>
+              <a:rPr lang="fr-FR" sz="7300" b="1" dirty="0" smtClean="0">
+                <a:solidFill>
+                  <a:srgbClr val="07578A"/>
+                </a:solidFill>
+                <a:latin typeface="Agency FB" pitchFamily="34" charset="0"/>
+              </a:rPr>
+              <a:t>système de   sécurité</a:t>
+            </a:r>
+            <a:r>
+              <a:rPr lang="fr-FR" sz="7300" dirty="0" smtClean="0">
+                <a:latin typeface="Agency FB" pitchFamily="34" charset="0"/>
+              </a:rPr>
+              <a:t>.</a:t>
             </a:r>
             <a:endParaRPr lang="fr-FR" sz="7300" dirty="0">
               <a:latin typeface="Agency FB" pitchFamily="34" charset="0"/>
@@ -3805,8 +3817,8 @@
         </p:nvSpPr>
         <p:spPr>
           <a:xfrm>
-            <a:off x="15925805" y="5545026"/>
-            <a:ext cx="13430344" cy="10941439"/>
+            <a:off x="15925805" y="5187836"/>
+            <a:ext cx="13430344" cy="13188208"/>
           </a:xfrm>
           <a:prstGeom prst="rect">
             <a:avLst/>
@@ -3823,7 +3835,7 @@
               <a:rPr lang="en-US" sz="7300" dirty="0" smtClean="0">
                 <a:latin typeface="Agency FB" pitchFamily="34" charset="0"/>
               </a:rPr>
-              <a:t>The Raymond </a:t>
+              <a:t>Raymond </a:t>
             </a:r>
             <a:r>
               <a:rPr lang="en-US" sz="7300" dirty="0" err="1" smtClean="0">
@@ -3835,13 +3847,7 @@
               <a:rPr lang="en-US" sz="7300" dirty="0" smtClean="0">
                 <a:latin typeface="Agency FB" pitchFamily="34" charset="0"/>
               </a:rPr>
-              <a:t> high school had to  think about a project to put on forward the BTS Numeric System so here is the project « House of future ». This </a:t>
-            </a:r>
-            <a:r>
-              <a:rPr lang="en-US" sz="7300" dirty="0" smtClean="0">
-                <a:latin typeface="Agency FB" pitchFamily="34" charset="0"/>
-              </a:rPr>
-              <a:t>project consist to </a:t>
+              <a:t> high school had to  think about a project to promote the Higher National Diploma (Digital Systems) so here is the project « House of the future ». This </a:t>
             </a:r>
             <a:r>
               <a:rPr lang="en-US" sz="7300" b="1" dirty="0" smtClean="0">
@@ -3850,13 +3856,28 @@
                 </a:solidFill>
                 <a:latin typeface="Agency FB" pitchFamily="34" charset="0"/>
               </a:rPr>
-              <a:t>connect a house </a:t>
+              <a:t>home automation </a:t>
+            </a:r>
+            <a:r>
+              <a:rPr lang="fr-FR" sz="7300" b="1" dirty="0" err="1" smtClean="0">
+                <a:solidFill>
+                  <a:srgbClr val="07578A"/>
+                </a:solidFill>
+                <a:latin typeface="Agency FB" pitchFamily="34" charset="0"/>
+              </a:rPr>
+              <a:t>project</a:t>
             </a:r>
             <a:r>
               <a:rPr lang="en-US" sz="7300" dirty="0" smtClean="0">
                 <a:latin typeface="Agency FB" pitchFamily="34" charset="0"/>
               </a:rPr>
-              <a:t>and all his sensors to an Android </a:t>
+              <a:t> </a:t>
+            </a:r>
+            <a:r>
+              <a:rPr lang="en-US" sz="7300" dirty="0" smtClean="0">
+                <a:latin typeface="Agency FB" pitchFamily="34" charset="0"/>
+              </a:rPr>
+              <a:t>consists to </a:t>
             </a:r>
             <a:r>
               <a:rPr lang="en-US" sz="7300" b="1" dirty="0" smtClean="0">
@@ -3865,13 +3886,13 @@
                 </a:solidFill>
                 <a:latin typeface="Agency FB" pitchFamily="34" charset="0"/>
               </a:rPr>
-              <a:t>application</a:t>
+              <a:t>connect a house </a:t>
             </a:r>
             <a:r>
               <a:rPr lang="en-US" sz="7300" dirty="0" smtClean="0">
                 <a:latin typeface="Agency FB" pitchFamily="34" charset="0"/>
               </a:rPr>
-              <a:t> and a </a:t>
+              <a:t>and all its sensors to an Android </a:t>
             </a:r>
             <a:r>
               <a:rPr lang="en-US" sz="7300" b="1" dirty="0" smtClean="0">
@@ -3880,7 +3901,13 @@
                 </a:solidFill>
                 <a:latin typeface="Agency FB" pitchFamily="34" charset="0"/>
               </a:rPr>
-              <a:t>Web </a:t>
+              <a:t>application</a:t>
+            </a:r>
+            <a:r>
+              <a:rPr lang="en-US" sz="7300" dirty="0" smtClean="0">
+                <a:latin typeface="Agency FB" pitchFamily="34" charset="0"/>
+              </a:rPr>
+              <a:t> and a </a:t>
             </a:r>
             <a:r>
               <a:rPr lang="en-US" sz="7300" b="1" dirty="0" smtClean="0">
@@ -3889,7 +3916,7 @@
                 </a:solidFill>
                 <a:latin typeface="Agency FB" pitchFamily="34" charset="0"/>
               </a:rPr>
-              <a:t>server</a:t>
+              <a:t>Web server</a:t>
             </a:r>
             <a:r>
               <a:rPr lang="en-US" sz="7300" dirty="0" smtClean="0">
@@ -3953,7 +3980,22 @@
               <a:rPr lang="en-US" sz="7300" dirty="0" smtClean="0">
                 <a:latin typeface="Agency FB" pitchFamily="34" charset="0"/>
               </a:rPr>
-              <a:t>. A </a:t>
+              <a:t>. The house will also be equipped with a </a:t>
+            </a:r>
+            <a:r>
+              <a:rPr lang="en-US" sz="7300" dirty="0" smtClean="0">
+                <a:solidFill>
+                  <a:schemeClr val="bg1"/>
+                </a:solidFill>
+                <a:latin typeface="Agency FB" pitchFamily="34" charset="0"/>
+              </a:rPr>
+              <a:t>bonjour je</a:t>
+            </a:r>
+            <a:r>
+              <a:rPr lang="en-US" sz="7300" dirty="0" smtClean="0">
+                <a:latin typeface="Agency FB" pitchFamily="34" charset="0"/>
+              </a:rPr>
+              <a:t> </a:t>
             </a:r>
             <a:r>
               <a:rPr lang="en-US" sz="7300" b="1" dirty="0" smtClean="0">
@@ -3962,13 +4004,13 @@
                 </a:solidFill>
                 <a:latin typeface="Agency FB" pitchFamily="34" charset="0"/>
               </a:rPr>
-              <a:t>security system </a:t>
+              <a:t>security system</a:t>
             </a:r>
             <a:r>
               <a:rPr lang="en-US" sz="7300" dirty="0" smtClean="0">
                 <a:latin typeface="Agency FB" pitchFamily="34" charset="0"/>
               </a:rPr>
-              <a:t>will also equip the house.</a:t>
+              <a:t>.</a:t>
             </a:r>
             <a:endParaRPr lang="en-US" sz="7300" dirty="0"/>
           </a:p>
@@ -4260,16 +4302,7 @@
                 </a:solidFill>
                 <a:latin typeface="Agency FB" pitchFamily="34" charset="0"/>
               </a:rPr>
-              <a:t>     GUYADER Benjamin | CHAUVEAU </a:t>
-            </a:r>
-            <a:r>
-              <a:rPr lang="fr-FR" sz="8000" dirty="0" smtClean="0">
-                <a:solidFill>
-                  <a:srgbClr val="07578A"/>
-                </a:solidFill>
-                <a:latin typeface="Agency FB" pitchFamily="34" charset="0"/>
-              </a:rPr>
-              <a:t>Aurélien </a:t>
+              <a:t>     GUYADER Benjamin | CHAUVEAU Aurélien </a:t>
             </a:r>
           </a:p>
           <a:p>
@@ -4324,6 +4357,13 @@
   <p:clrMapOvr>
     <a:masterClrMapping/>
   </p:clrMapOvr>
+  <p:timing>
+    <p:tnLst>
+      <p:par>
+        <p:cTn id="1" dur="indefinite" restart="never" nodeType="tmRoot"/>
+      </p:par>
+    </p:tnLst>
+  </p:timing>
 </p:sld>
 </file>
 

</xml_diff>